<commit_message>
added notes for MP2
</commit_message>
<xml_diff>
--- a/HW1.pptx
+++ b/HW1.pptx
@@ -112,6 +112,11 @@
       </a:defRPr>
     </a:lvl9pPr>
   </p:defaultTextStyle>
+  <p:extLst>
+    <p:ext uri="{EFAFB233-063F-42B5-8137-9DF3F51BA10A}">
+      <p15:sldGuideLst xmlns:p15="http://schemas.microsoft.com/office/powerpoint/2012/main"/>
+    </p:ext>
+  </p:extLst>
 </p:presentation>
 </file>
 
@@ -197,7 +202,7 @@
           <a:p>
             <a:fld id="{2747D2AE-6F0F-1942-B8BE-938C97736A66}" type="datetimeFigureOut">
               <a:rPr lang="en-US" smtClean="0"/>
-              <a:t>4/18/23</a:t>
+              <a:t>4/21/23</a:t>
             </a:fld>
             <a:endParaRPr lang="en-US"/>
           </a:p>
@@ -704,7 +709,7 @@
           <a:p>
             <a:fld id="{02AC24A9-CCB6-4F8D-B8DB-C2F3692CFA5A}" type="datetimeFigureOut">
               <a:rPr lang="en-US" smtClean="0"/>
-              <a:t>4/18/23</a:t>
+              <a:t>4/21/23</a:t>
             </a:fld>
             <a:endParaRPr lang="en-US" dirty="0"/>
           </a:p>
@@ -1074,7 +1079,7 @@
           <a:p>
             <a:fld id="{02AC24A9-CCB6-4F8D-B8DB-C2F3692CFA5A}" type="datetimeFigureOut">
               <a:rPr lang="en-US" smtClean="0"/>
-              <a:t>4/18/23</a:t>
+              <a:t>4/21/23</a:t>
             </a:fld>
             <a:endParaRPr lang="en-US"/>
           </a:p>
@@ -1283,7 +1288,7 @@
           <a:p>
             <a:fld id="{02AC24A9-CCB6-4F8D-B8DB-C2F3692CFA5A}" type="datetimeFigureOut">
               <a:rPr lang="en-US" smtClean="0"/>
-              <a:t>4/18/23</a:t>
+              <a:t>4/21/23</a:t>
             </a:fld>
             <a:endParaRPr lang="en-US"/>
           </a:p>
@@ -1753,7 +1758,7 @@
           <a:p>
             <a:fld id="{02AC24A9-CCB6-4F8D-B8DB-C2F3692CFA5A}" type="datetimeFigureOut">
               <a:rPr lang="en-US" smtClean="0"/>
-              <a:t>4/18/23</a:t>
+              <a:t>4/21/23</a:t>
             </a:fld>
             <a:endParaRPr lang="en-US"/>
           </a:p>
@@ -2207,7 +2212,7 @@
           <a:p>
             <a:fld id="{02AC24A9-CCB6-4F8D-B8DB-C2F3692CFA5A}" type="datetimeFigureOut">
               <a:rPr lang="en-US" smtClean="0"/>
-              <a:t>4/18/23</a:t>
+              <a:t>4/21/23</a:t>
             </a:fld>
             <a:endParaRPr lang="en-US"/>
           </a:p>
@@ -2739,7 +2744,7 @@
           <a:p>
             <a:fld id="{02AC24A9-CCB6-4F8D-B8DB-C2F3692CFA5A}" type="datetimeFigureOut">
               <a:rPr lang="en-US" smtClean="0"/>
-              <a:t>4/18/23</a:t>
+              <a:t>4/21/23</a:t>
             </a:fld>
             <a:endParaRPr lang="en-US"/>
           </a:p>
@@ -3438,7 +3443,7 @@
           <a:p>
             <a:fld id="{02AC24A9-CCB6-4F8D-B8DB-C2F3692CFA5A}" type="datetimeFigureOut">
               <a:rPr lang="en-US" smtClean="0"/>
-              <a:t>4/18/23</a:t>
+              <a:t>4/21/23</a:t>
             </a:fld>
             <a:endParaRPr lang="en-US"/>
           </a:p>
@@ -3767,7 +3772,7 @@
           <a:p>
             <a:fld id="{02AC24A9-CCB6-4F8D-B8DB-C2F3692CFA5A}" type="datetimeFigureOut">
               <a:rPr lang="en-US" smtClean="0"/>
-              <a:t>4/18/23</a:t>
+              <a:t>4/21/23</a:t>
             </a:fld>
             <a:endParaRPr lang="en-US"/>
           </a:p>
@@ -3880,7 +3885,7 @@
           <a:p>
             <a:fld id="{02AC24A9-CCB6-4F8D-B8DB-C2F3692CFA5A}" type="datetimeFigureOut">
               <a:rPr lang="en-US" smtClean="0"/>
-              <a:t>4/18/23</a:t>
+              <a:t>4/21/23</a:t>
             </a:fld>
             <a:endParaRPr lang="en-US"/>
           </a:p>
@@ -4375,7 +4380,7 @@
           <a:p>
             <a:fld id="{02AC24A9-CCB6-4F8D-B8DB-C2F3692CFA5A}" type="datetimeFigureOut">
               <a:rPr lang="en-US" smtClean="0"/>
-              <a:t>4/18/23</a:t>
+              <a:t>4/21/23</a:t>
             </a:fld>
             <a:endParaRPr lang="en-US" dirty="0"/>
           </a:p>
@@ -4852,7 +4857,7 @@
           <a:p>
             <a:fld id="{02AC24A9-CCB6-4F8D-B8DB-C2F3692CFA5A}" type="datetimeFigureOut">
               <a:rPr lang="en-US" smtClean="0"/>
-              <a:t>4/18/23</a:t>
+              <a:t>4/21/23</a:t>
             </a:fld>
             <a:endParaRPr lang="en-US"/>
           </a:p>
@@ -5095,7 +5100,7 @@
           <a:p>
             <a:fld id="{02AC24A9-CCB6-4F8D-B8DB-C2F3692CFA5A}" type="datetimeFigureOut">
               <a:rPr lang="en-US" smtClean="0"/>
-              <a:t>4/18/23</a:t>
+              <a:t>4/21/23</a:t>
             </a:fld>
             <a:endParaRPr lang="en-US"/>
           </a:p>
@@ -8329,8 +8334,8 @@
         </p:nvSpPr>
         <p:spPr>
           <a:xfrm>
-            <a:off x="769234" y="5435162"/>
-            <a:ext cx="2657138" cy="646331"/>
+            <a:off x="504259" y="5435162"/>
+            <a:ext cx="3584186" cy="923330"/>
           </a:xfrm>
           <a:prstGeom prst="rect">
             <a:avLst/>
@@ -8353,6 +8358,12 @@
             <a:r>
               <a:rPr lang="en-US" dirty="0"/>
               <a:t>Hard to scale with MNA</a:t>
+            </a:r>
+          </a:p>
+          <a:p>
+            <a:r>
+              <a:rPr lang="en-US" dirty="0"/>
+              <a:t>     - Specifically CCCS and CCVS</a:t>
             </a:r>
           </a:p>
         </p:txBody>
@@ -13235,7 +13246,7 @@
         </p:nvSpPr>
         <p:spPr>
           <a:xfrm>
-            <a:off x="9246448" y="3014240"/>
+            <a:off x="9230471" y="3257894"/>
             <a:ext cx="2747868" cy="1600438"/>
           </a:xfrm>
           <a:prstGeom prst="rect">
@@ -13915,6 +13926,140 @@
           </a:fontRef>
         </p:style>
       </p:cxnSp>
+      <p:sp>
+        <p:nvSpPr>
+          <p:cNvPr id="3" name="TextBox 2">
+            <a:extLst>
+              <a:ext uri="{FF2B5EF4-FFF2-40B4-BE49-F238E27FC236}">
+                <a16:creationId xmlns:a16="http://schemas.microsoft.com/office/drawing/2014/main" id="{7606B174-3345-4514-B127-31F797E7BD80}"/>
+              </a:ext>
+            </a:extLst>
+          </p:cNvPr>
+          <p:cNvSpPr txBox="1"/>
+          <p:nvPr/>
+        </p:nvSpPr>
+        <p:spPr>
+          <a:xfrm>
+            <a:off x="10305009" y="2131963"/>
+            <a:ext cx="1059906" cy="1107996"/>
+          </a:xfrm>
+          <a:prstGeom prst="rect">
+            <a:avLst/>
+          </a:prstGeom>
+          <a:noFill/>
+        </p:spPr>
+        <p:txBody>
+          <a:bodyPr wrap="none" rtlCol="0">
+            <a:spAutoFit/>
+          </a:bodyPr>
+          <a:lstStyle/>
+          <a:p>
+            <a:r>
+              <a:rPr lang="en-US" sz="800" b="0" dirty="0">
+                <a:solidFill>
+                  <a:srgbClr val="ABB2BF"/>
+                </a:solidFill>
+                <a:effectLst/>
+                <a:latin typeface="Menlo" panose="020B0609030804020204" pitchFamily="49" charset="0"/>
+              </a:rPr>
+              <a:t>resistors = []</a:t>
+            </a:r>
+          </a:p>
+          <a:p>
+            <a:r>
+              <a:rPr lang="en-US" sz="800" b="0" dirty="0">
+                <a:solidFill>
+                  <a:srgbClr val="ABB2BF"/>
+                </a:solidFill>
+                <a:effectLst/>
+                <a:latin typeface="Menlo" panose="020B0609030804020204" pitchFamily="49" charset="0"/>
+              </a:rPr>
+              <a:t>voltages = []</a:t>
+            </a:r>
+          </a:p>
+          <a:p>
+            <a:r>
+              <a:rPr lang="en-US" sz="800" b="0" dirty="0">
+                <a:solidFill>
+                  <a:srgbClr val="ABB2BF"/>
+                </a:solidFill>
+                <a:effectLst/>
+                <a:latin typeface="Menlo" panose="020B0609030804020204" pitchFamily="49" charset="0"/>
+              </a:rPr>
+              <a:t>currents = []</a:t>
+            </a:r>
+          </a:p>
+          <a:p>
+            <a:r>
+              <a:rPr lang="en-US" sz="800" b="0" dirty="0" err="1">
+                <a:solidFill>
+                  <a:srgbClr val="ABB2BF"/>
+                </a:solidFill>
+                <a:effectLst/>
+                <a:latin typeface="Menlo" panose="020B0609030804020204" pitchFamily="49" charset="0"/>
+              </a:rPr>
+              <a:t>vccs</a:t>
+            </a:r>
+            <a:r>
+              <a:rPr lang="en-US" sz="800" b="0" dirty="0">
+                <a:solidFill>
+                  <a:srgbClr val="ABB2BF"/>
+                </a:solidFill>
+                <a:effectLst/>
+                <a:latin typeface="Menlo" panose="020B0609030804020204" pitchFamily="49" charset="0"/>
+              </a:rPr>
+              <a:t> = []</a:t>
+            </a:r>
+          </a:p>
+          <a:p>
+            <a:r>
+              <a:rPr lang="en-US" sz="800" b="0" dirty="0" err="1">
+                <a:solidFill>
+                  <a:srgbClr val="ABB2BF"/>
+                </a:solidFill>
+                <a:effectLst/>
+                <a:latin typeface="Menlo" panose="020B0609030804020204" pitchFamily="49" charset="0"/>
+              </a:rPr>
+              <a:t>ccvs</a:t>
+            </a:r>
+            <a:r>
+              <a:rPr lang="en-US" sz="800" b="0" dirty="0">
+                <a:solidFill>
+                  <a:srgbClr val="ABB2BF"/>
+                </a:solidFill>
+                <a:effectLst/>
+                <a:latin typeface="Menlo" panose="020B0609030804020204" pitchFamily="49" charset="0"/>
+              </a:rPr>
+              <a:t> = []</a:t>
+            </a:r>
+          </a:p>
+          <a:p>
+            <a:r>
+              <a:rPr lang="en-US" sz="800" b="0" dirty="0" err="1">
+                <a:solidFill>
+                  <a:srgbClr val="ABB2BF"/>
+                </a:solidFill>
+                <a:effectLst/>
+                <a:latin typeface="Menlo" panose="020B0609030804020204" pitchFamily="49" charset="0"/>
+              </a:rPr>
+              <a:t>cccs</a:t>
+            </a:r>
+            <a:r>
+              <a:rPr lang="en-US" sz="800" b="0" dirty="0">
+                <a:solidFill>
+                  <a:srgbClr val="ABB2BF"/>
+                </a:solidFill>
+                <a:effectLst/>
+                <a:latin typeface="Menlo" panose="020B0609030804020204" pitchFamily="49" charset="0"/>
+              </a:rPr>
+              <a:t> = []</a:t>
+            </a:r>
+          </a:p>
+          <a:p>
+            <a:endParaRPr lang="en-US" dirty="0"/>
+          </a:p>
+        </p:txBody>
+      </p:sp>
     </p:spTree>
     <p:extLst>
       <p:ext uri="{BB962C8B-B14F-4D97-AF65-F5344CB8AC3E}">
@@ -14021,8 +14166,8 @@
           </a:p>
         </p:txBody>
       </p:sp>
-      <mc:AlternateContent xmlns:mc="http://schemas.openxmlformats.org/markup-compatibility/2006">
-        <mc:Choice xmlns:a14="http://schemas.microsoft.com/office/drawing/2010/main" Requires="a14">
+      <mc:AlternateContent xmlns:mc="http://schemas.openxmlformats.org/markup-compatibility/2006" xmlns:a14="http://schemas.microsoft.com/office/drawing/2010/main">
+        <mc:Choice Requires="a14">
           <p:sp>
             <p:nvSpPr>
               <p:cNvPr id="16" name="TextBox 15">
@@ -14051,6 +14196,7 @@
               </a:bodyPr>
               <a:lstStyle/>
               <a:p>
+                <a:pPr/>
                 <a14:m>
                   <m:oMathPara xmlns:m="http://schemas.openxmlformats.org/officeDocument/2006/math">
                     <m:oMathParaPr>
@@ -14144,7 +14290,7 @@
             </p:txBody>
           </p:sp>
         </mc:Choice>
-        <mc:Fallback>
+        <mc:Fallback xmlns="">
           <p:sp>
             <p:nvSpPr>
               <p:cNvPr id="16" name="TextBox 15">
@@ -14189,8 +14335,8 @@
           </p:sp>
         </mc:Fallback>
       </mc:AlternateContent>
-      <mc:AlternateContent xmlns:mc="http://schemas.openxmlformats.org/markup-compatibility/2006">
-        <mc:Choice xmlns:a14="http://schemas.microsoft.com/office/drawing/2010/main" Requires="a14">
+      <mc:AlternateContent xmlns:mc="http://schemas.openxmlformats.org/markup-compatibility/2006" xmlns:a14="http://schemas.microsoft.com/office/drawing/2010/main">
+        <mc:Choice Requires="a14">
           <p:sp>
             <p:nvSpPr>
               <p:cNvPr id="17" name="TextBox 16">
@@ -14298,7 +14444,7 @@
             </p:txBody>
           </p:sp>
         </mc:Choice>
-        <mc:Fallback>
+        <mc:Fallback xmlns="">
           <p:sp>
             <p:nvSpPr>
               <p:cNvPr id="17" name="TextBox 16">
@@ -14986,8 +15132,8 @@
           </a:fontRef>
         </p:style>
       </p:cxnSp>
-      <mc:AlternateContent xmlns:mc="http://schemas.openxmlformats.org/markup-compatibility/2006">
-        <mc:Choice xmlns:a14="http://schemas.microsoft.com/office/drawing/2010/main" Requires="a14">
+      <mc:AlternateContent xmlns:mc="http://schemas.openxmlformats.org/markup-compatibility/2006" xmlns:a14="http://schemas.microsoft.com/office/drawing/2010/main">
+        <mc:Choice Requires="a14">
           <p:sp>
             <p:nvSpPr>
               <p:cNvPr id="8" name="TextBox 7">
@@ -15016,6 +15162,7 @@
               </a:bodyPr>
               <a:lstStyle/>
               <a:p>
+                <a:pPr/>
                 <a14:m>
                   <m:oMathPara xmlns:m="http://schemas.openxmlformats.org/officeDocument/2006/math">
                     <m:oMathParaPr>
@@ -15035,13 +15182,7 @@
                             <a:rPr lang="en-US" b="0" i="1" smtClean="0">
                               <a:latin typeface="Cambria Math" panose="02040503050406030204" pitchFamily="18" charset="0"/>
                             </a:rPr>
-                            <m:t>2</m:t>
-                          </m:r>
-                          <m:r>
-                            <a:rPr lang="en-US" b="0" i="1" smtClean="0">
-                              <a:latin typeface="Cambria Math" panose="02040503050406030204" pitchFamily="18" charset="0"/>
-                            </a:rPr>
-                            <m:t>−</m:t>
+                            <m:t>2−</m:t>
                           </m:r>
                           <m:r>
                             <a:rPr lang="en-US" b="0" i="1" smtClean="0">
@@ -15195,7 +15336,7 @@
             </p:txBody>
           </p:sp>
         </mc:Choice>
-        <mc:Fallback>
+        <mc:Fallback xmlns="">
           <p:sp>
             <p:nvSpPr>
               <p:cNvPr id="8" name="TextBox 7">
@@ -15240,8 +15381,8 @@
           </p:sp>
         </mc:Fallback>
       </mc:AlternateContent>
-      <mc:AlternateContent xmlns:mc="http://schemas.openxmlformats.org/markup-compatibility/2006">
-        <mc:Choice xmlns:a14="http://schemas.microsoft.com/office/drawing/2010/main" Requires="a14">
+      <mc:AlternateContent xmlns:mc="http://schemas.openxmlformats.org/markup-compatibility/2006" xmlns:a14="http://schemas.microsoft.com/office/drawing/2010/main">
+        <mc:Choice Requires="a14">
           <p:sp>
             <p:nvSpPr>
               <p:cNvPr id="9" name="TextBox 8">
@@ -15270,6 +15411,7 @@
               </a:bodyPr>
               <a:lstStyle/>
               <a:p>
+                <a:pPr/>
                 <a14:m>
                   <m:oMathPara xmlns:m="http://schemas.openxmlformats.org/officeDocument/2006/math">
                     <m:oMathParaPr>
@@ -15339,7 +15481,7 @@
             </p:txBody>
           </p:sp>
         </mc:Choice>
-        <mc:Fallback>
+        <mc:Fallback xmlns="">
           <p:sp>
             <p:nvSpPr>
               <p:cNvPr id="9" name="TextBox 8">
@@ -15384,8 +15526,8 @@
           </p:sp>
         </mc:Fallback>
       </mc:AlternateContent>
-      <mc:AlternateContent xmlns:mc="http://schemas.openxmlformats.org/markup-compatibility/2006">
-        <mc:Choice xmlns:a14="http://schemas.microsoft.com/office/drawing/2010/main" Requires="a14">
+      <mc:AlternateContent xmlns:mc="http://schemas.openxmlformats.org/markup-compatibility/2006" xmlns:a14="http://schemas.microsoft.com/office/drawing/2010/main">
+        <mc:Choice Requires="a14">
           <p:sp>
             <p:nvSpPr>
               <p:cNvPr id="10" name="TextBox 9">
@@ -15414,6 +15556,7 @@
               </a:bodyPr>
               <a:lstStyle/>
               <a:p>
+                <a:pPr/>
                 <a14:m>
                   <m:oMathPara xmlns:m="http://schemas.openxmlformats.org/officeDocument/2006/math">
                     <m:oMathParaPr>
@@ -15458,7 +15601,7 @@
             </p:txBody>
           </p:sp>
         </mc:Choice>
-        <mc:Fallback>
+        <mc:Fallback xmlns="">
           <p:sp>
             <p:nvSpPr>
               <p:cNvPr id="10" name="TextBox 9">
@@ -15503,8 +15646,8 @@
           </p:sp>
         </mc:Fallback>
       </mc:AlternateContent>
-      <mc:AlternateContent xmlns:mc="http://schemas.openxmlformats.org/markup-compatibility/2006">
-        <mc:Choice xmlns:a14="http://schemas.microsoft.com/office/drawing/2010/main" Requires="a14">
+      <mc:AlternateContent xmlns:mc="http://schemas.openxmlformats.org/markup-compatibility/2006" xmlns:a14="http://schemas.microsoft.com/office/drawing/2010/main">
+        <mc:Choice Requires="a14">
           <p:sp>
             <p:nvSpPr>
               <p:cNvPr id="11" name="TextBox 10">
@@ -15533,6 +15676,7 @@
               </a:bodyPr>
               <a:lstStyle/>
               <a:p>
+                <a:pPr/>
                 <a14:m>
                   <m:oMathPara xmlns:m="http://schemas.openxmlformats.org/officeDocument/2006/math">
                     <m:oMathParaPr>
@@ -15589,7 +15733,7 @@
             </p:txBody>
           </p:sp>
         </mc:Choice>
-        <mc:Fallback>
+        <mc:Fallback xmlns="">
           <p:sp>
             <p:nvSpPr>
               <p:cNvPr id="11" name="TextBox 10">
@@ -15634,8 +15778,8 @@
           </p:sp>
         </mc:Fallback>
       </mc:AlternateContent>
-      <mc:AlternateContent xmlns:mc="http://schemas.openxmlformats.org/markup-compatibility/2006">
-        <mc:Choice xmlns:a14="http://schemas.microsoft.com/office/drawing/2010/main" Requires="a14">
+      <mc:AlternateContent xmlns:mc="http://schemas.openxmlformats.org/markup-compatibility/2006" xmlns:a14="http://schemas.microsoft.com/office/drawing/2010/main">
+        <mc:Choice Requires="a14">
           <p:sp>
             <p:nvSpPr>
               <p:cNvPr id="12" name="TextBox 11">
@@ -15664,6 +15808,7 @@
               </a:bodyPr>
               <a:lstStyle/>
               <a:p>
+                <a:pPr/>
                 <a14:m>
                   <m:oMathPara xmlns:m="http://schemas.openxmlformats.org/officeDocument/2006/math">
                     <m:oMathParaPr>
@@ -15702,7 +15847,7 @@
             </p:txBody>
           </p:sp>
         </mc:Choice>
-        <mc:Fallback>
+        <mc:Fallback xmlns="">
           <p:sp>
             <p:nvSpPr>
               <p:cNvPr id="12" name="TextBox 11">
@@ -15747,8 +15892,8 @@
           </p:sp>
         </mc:Fallback>
       </mc:AlternateContent>
-      <mc:AlternateContent xmlns:mc="http://schemas.openxmlformats.org/markup-compatibility/2006">
-        <mc:Choice xmlns:a14="http://schemas.microsoft.com/office/drawing/2010/main" Requires="a14">
+      <mc:AlternateContent xmlns:mc="http://schemas.openxmlformats.org/markup-compatibility/2006" xmlns:a14="http://schemas.microsoft.com/office/drawing/2010/main">
+        <mc:Choice Requires="a14">
           <p:sp>
             <p:nvSpPr>
               <p:cNvPr id="13" name="TextBox 12">
@@ -15777,6 +15922,7 @@
               </a:bodyPr>
               <a:lstStyle/>
               <a:p>
+                <a:pPr/>
                 <a14:m>
                   <m:oMathPara xmlns:m="http://schemas.openxmlformats.org/officeDocument/2006/math">
                     <m:oMathParaPr>
@@ -15833,7 +15979,7 @@
             </p:txBody>
           </p:sp>
         </mc:Choice>
-        <mc:Fallback>
+        <mc:Fallback xmlns="">
           <p:sp>
             <p:nvSpPr>
               <p:cNvPr id="13" name="TextBox 12">
@@ -15878,8 +16024,8 @@
           </p:sp>
         </mc:Fallback>
       </mc:AlternateContent>
-      <mc:AlternateContent xmlns:mc="http://schemas.openxmlformats.org/markup-compatibility/2006">
-        <mc:Choice xmlns:a14="http://schemas.microsoft.com/office/drawing/2010/main" Requires="a14">
+      <mc:AlternateContent xmlns:mc="http://schemas.openxmlformats.org/markup-compatibility/2006" xmlns:a14="http://schemas.microsoft.com/office/drawing/2010/main">
+        <mc:Choice Requires="a14">
           <p:sp>
             <p:nvSpPr>
               <p:cNvPr id="14" name="TextBox 13">
@@ -15908,6 +16054,7 @@
               </a:bodyPr>
               <a:lstStyle/>
               <a:p>
+                <a:pPr/>
                 <a14:m>
                   <m:oMathPara xmlns:m="http://schemas.openxmlformats.org/officeDocument/2006/math">
                     <m:oMathParaPr>
@@ -15946,7 +16093,7 @@
             </p:txBody>
           </p:sp>
         </mc:Choice>
-        <mc:Fallback>
+        <mc:Fallback xmlns="">
           <p:sp>
             <p:nvSpPr>
               <p:cNvPr id="14" name="TextBox 13">
@@ -15991,8 +16138,8 @@
           </p:sp>
         </mc:Fallback>
       </mc:AlternateContent>
-      <mc:AlternateContent xmlns:mc="http://schemas.openxmlformats.org/markup-compatibility/2006">
-        <mc:Choice xmlns:a14="http://schemas.microsoft.com/office/drawing/2010/main" Requires="a14">
+      <mc:AlternateContent xmlns:mc="http://schemas.openxmlformats.org/markup-compatibility/2006" xmlns:a14="http://schemas.microsoft.com/office/drawing/2010/main">
+        <mc:Choice Requires="a14">
           <p:sp>
             <p:nvSpPr>
               <p:cNvPr id="21" name="TextBox 20">
@@ -16021,6 +16168,7 @@
               </a:bodyPr>
               <a:lstStyle/>
               <a:p>
+                <a:pPr/>
                 <a14:m>
                   <m:oMathPara xmlns:m="http://schemas.openxmlformats.org/officeDocument/2006/math">
                     <m:oMathParaPr>
@@ -16053,7 +16201,7 @@
             </p:txBody>
           </p:sp>
         </mc:Choice>
-        <mc:Fallback>
+        <mc:Fallback xmlns="">
           <p:sp>
             <p:nvSpPr>
               <p:cNvPr id="21" name="TextBox 20">
@@ -16098,8 +16246,8 @@
           </p:sp>
         </mc:Fallback>
       </mc:AlternateContent>
-      <mc:AlternateContent xmlns:mc="http://schemas.openxmlformats.org/markup-compatibility/2006">
-        <mc:Choice xmlns:a14="http://schemas.microsoft.com/office/drawing/2010/main" Requires="a14">
+      <mc:AlternateContent xmlns:mc="http://schemas.openxmlformats.org/markup-compatibility/2006" xmlns:a14="http://schemas.microsoft.com/office/drawing/2010/main">
+        <mc:Choice Requires="a14">
           <p:sp>
             <p:nvSpPr>
               <p:cNvPr id="25" name="TextBox 24">
@@ -16128,6 +16276,7 @@
               </a:bodyPr>
               <a:lstStyle/>
               <a:p>
+                <a:pPr/>
                 <a14:m>
                   <m:oMathPara xmlns:m="http://schemas.openxmlformats.org/officeDocument/2006/math">
                     <m:oMathParaPr>
@@ -16160,7 +16309,7 @@
             </p:txBody>
           </p:sp>
         </mc:Choice>
-        <mc:Fallback>
+        <mc:Fallback xmlns="">
           <p:sp>
             <p:nvSpPr>
               <p:cNvPr id="25" name="TextBox 24">
@@ -16292,6 +16441,12 @@
           <a:p>
             <a:r>
               <a:rPr lang="en-US" dirty="0"/>
+              <a:t>Output file message could be better organized.</a:t>
+            </a:r>
+          </a:p>
+          <a:p>
+            <a:r>
+              <a:rPr lang="en-US" dirty="0"/>
               <a:t>Currently no support for Capacitors and Inductors treated as open and short circuits, respectively.</a:t>
             </a:r>
           </a:p>
@@ -16311,8 +16466,8 @@
         </p:nvGrpSpPr>
         <p:grpSpPr>
           <a:xfrm>
-            <a:off x="3905055" y="4206240"/>
-            <a:ext cx="3878775" cy="2274570"/>
+            <a:off x="4327965" y="4949190"/>
+            <a:ext cx="3307275" cy="1668780"/>
             <a:chOff x="3699315" y="3429000"/>
             <a:chExt cx="4540504" cy="2880360"/>
           </a:xfrm>

</xml_diff>